<commit_message>
Slides for 9/4 and added learning objectives for earlier slides
</commit_message>
<xml_diff>
--- a/slides/08-26-Introduction.pptx
+++ b/slides/08-26-Introduction.pptx
@@ -3740,7 +3740,7 @@
           </a:prstGeom>
         </p:spPr>
         <p:txBody>
-          <a:bodyPr/>
+          <a:bodyPr numCol="2" spcCol="1155700"/>
           <a:lstStyle/>
           <a:p>
             <a:pPr/>
@@ -3806,6 +3806,30 @@
             <a:pPr lvl="2"/>
             <a:r>
               <a:t>Definition of a Hermitian operator</a:t>
+            </a:r>
+          </a:p>
+          <a:p>
+            <a:pPr lvl="2"/>
+            <a:r>
+              <a:t>This lecture is designed to help you achieve the following learning objectives</a:t>
+            </a:r>
+          </a:p>
+          <a:p>
+            <a:pPr lvl="3"/>
+            <a:r>
+              <a:t>Define operators and apply them to functions</a:t>
+            </a:r>
+          </a:p>
+          <a:p>
+            <a:pPr lvl="3"/>
+            <a:r>
+              <a:t>Evaluate commutators</a:t>
+            </a:r>
+          </a:p>
+          <a:p>
+            <a:pPr lvl="3"/>
+            <a:r>
+              <a:t>Write mathematical expressions in Dirac Bra-Ket notation</a:t>
             </a:r>
           </a:p>
         </p:txBody>
@@ -4247,6 +4271,126 @@
                                           <p:spTgt spid="179">
                                             <p:txEl>
                                               <p:pRg st="10" end="10"/>
+                                            </p:txEl>
+                                          </p:spTgt>
+                                        </p:tgtEl>
+                                        <p:attrNameLst>
+                                          <p:attrName>style.visibility</p:attrName>
+                                        </p:attrNameLst>
+                                      </p:cBhvr>
+                                      <p:to>
+                                        <p:strVal val="visible"/>
+                                      </p:to>
+                                    </p:set>
+                                  </p:childTnLst>
+                                </p:cTn>
+                              </p:par>
+                              <p:par>
+                                <p:cTn id="33" presetClass="entr" nodeType="withEffect" presetSubtype="0" presetID="1" grpId="1" fill="hold">
+                                  <p:stCondLst>
+                                    <p:cond delay="0"/>
+                                  </p:stCondLst>
+                                  <p:iterate type="el" backwards="0">
+                                    <p:tmAbs val="0"/>
+                                  </p:iterate>
+                                  <p:childTnLst>
+                                    <p:set>
+                                      <p:cBhvr>
+                                        <p:cTn id="34" fill="hold"/>
+                                        <p:tgtEl>
+                                          <p:spTgt spid="179">
+                                            <p:txEl>
+                                              <p:pRg st="11" end="11"/>
+                                            </p:txEl>
+                                          </p:spTgt>
+                                        </p:tgtEl>
+                                        <p:attrNameLst>
+                                          <p:attrName>style.visibility</p:attrName>
+                                        </p:attrNameLst>
+                                      </p:cBhvr>
+                                      <p:to>
+                                        <p:strVal val="visible"/>
+                                      </p:to>
+                                    </p:set>
+                                  </p:childTnLst>
+                                </p:cTn>
+                              </p:par>
+                              <p:par>
+                                <p:cTn id="35" presetClass="entr" nodeType="withEffect" presetSubtype="0" presetID="1" grpId="1" fill="hold">
+                                  <p:stCondLst>
+                                    <p:cond delay="0"/>
+                                  </p:stCondLst>
+                                  <p:iterate type="el" backwards="0">
+                                    <p:tmAbs val="0"/>
+                                  </p:iterate>
+                                  <p:childTnLst>
+                                    <p:set>
+                                      <p:cBhvr>
+                                        <p:cTn id="36" fill="hold"/>
+                                        <p:tgtEl>
+                                          <p:spTgt spid="179">
+                                            <p:txEl>
+                                              <p:pRg st="12" end="12"/>
+                                            </p:txEl>
+                                          </p:spTgt>
+                                        </p:tgtEl>
+                                        <p:attrNameLst>
+                                          <p:attrName>style.visibility</p:attrName>
+                                        </p:attrNameLst>
+                                      </p:cBhvr>
+                                      <p:to>
+                                        <p:strVal val="visible"/>
+                                      </p:to>
+                                    </p:set>
+                                  </p:childTnLst>
+                                </p:cTn>
+                              </p:par>
+                              <p:par>
+                                <p:cTn id="37" presetClass="entr" nodeType="withEffect" presetSubtype="0" presetID="1" grpId="1" fill="hold">
+                                  <p:stCondLst>
+                                    <p:cond delay="0"/>
+                                  </p:stCondLst>
+                                  <p:iterate type="el" backwards="0">
+                                    <p:tmAbs val="0"/>
+                                  </p:iterate>
+                                  <p:childTnLst>
+                                    <p:set>
+                                      <p:cBhvr>
+                                        <p:cTn id="38" fill="hold"/>
+                                        <p:tgtEl>
+                                          <p:spTgt spid="179">
+                                            <p:txEl>
+                                              <p:pRg st="13" end="13"/>
+                                            </p:txEl>
+                                          </p:spTgt>
+                                        </p:tgtEl>
+                                        <p:attrNameLst>
+                                          <p:attrName>style.visibility</p:attrName>
+                                        </p:attrNameLst>
+                                      </p:cBhvr>
+                                      <p:to>
+                                        <p:strVal val="visible"/>
+                                      </p:to>
+                                    </p:set>
+                                  </p:childTnLst>
+                                </p:cTn>
+                              </p:par>
+                              <p:par>
+                                <p:cTn id="39" presetClass="entr" nodeType="withEffect" presetSubtype="0" presetID="1" grpId="1" fill="hold">
+                                  <p:stCondLst>
+                                    <p:cond delay="0"/>
+                                  </p:stCondLst>
+                                  <p:iterate type="el" backwards="0">
+                                    <p:tmAbs val="0"/>
+                                  </p:iterate>
+                                  <p:childTnLst>
+                                    <p:set>
+                                      <p:cBhvr>
+                                        <p:cTn id="40" fill="hold"/>
+                                        <p:tgtEl>
+                                          <p:spTgt spid="179">
+                                            <p:txEl>
+                                              <p:pRg st="14" end="14"/>
                                             </p:txEl>
                                           </p:spTgt>
                                         </p:tgtEl>

</xml_diff>